<commit_message>
changed centos 7.3 to 7 to match AMI, updated screenshots, regenerated pdfs
</commit_message>
<xml_diff>
--- a/03-writing_a_test_first.pptx
+++ b/03-writing_a_test_first.pptx
@@ -333,7 +333,7 @@
               <a:pPr>
                 <a:defRPr/>
               </a:pPr>
-              <a:t>2018-03-12</a:t>
+              <a:t>2018-03-23</a:t>
             </a:fld>
             <a:endParaRPr lang="en-US" dirty="0"/>
           </a:p>
@@ -9086,14 +9086,14 @@
           </a:ln>
           <a:extLst>
             <a:ext uri="{909E8E84-426E-40dd-AFC4-6F175D3DCCD1}">
-              <a14:hiddenFill xmlns:a14="http://schemas.microsoft.com/office/drawing/2010/main" xmlns="">
+              <a14:hiddenFill xmlns="" xmlns:a14="http://schemas.microsoft.com/office/drawing/2010/main">
                 <a:solidFill>
                   <a:srgbClr val="FFFFFF"/>
                 </a:solidFill>
               </a14:hiddenFill>
             </a:ext>
             <a:ext uri="{91240B29-F687-4f45-9708-019B960494DF}">
-              <a14:hiddenLine xmlns:a14="http://schemas.microsoft.com/office/drawing/2010/main" xmlns="" w="9525">
+              <a14:hiddenLine xmlns="" xmlns:a14="http://schemas.microsoft.com/office/drawing/2010/main" w="9525">
                 <a:solidFill>
                   <a:srgbClr val="000000"/>
                 </a:solidFill>
@@ -9241,14 +9241,14 @@
           </a:ln>
           <a:extLst>
             <a:ext uri="{909E8E84-426E-40dd-AFC4-6F175D3DCCD1}">
-              <a14:hiddenFill xmlns:a14="http://schemas.microsoft.com/office/drawing/2010/main" xmlns="">
+              <a14:hiddenFill xmlns="" xmlns:a14="http://schemas.microsoft.com/office/drawing/2010/main">
                 <a:solidFill>
                   <a:srgbClr val="FFFFFF"/>
                 </a:solidFill>
               </a14:hiddenFill>
             </a:ext>
             <a:ext uri="{91240B29-F687-4f45-9708-019B960494DF}">
-              <a14:hiddenLine xmlns:a14="http://schemas.microsoft.com/office/drawing/2010/main" xmlns="" w="9525">
+              <a14:hiddenLine xmlns="" xmlns:a14="http://schemas.microsoft.com/office/drawing/2010/main" w="9525">
                 <a:solidFill>
                   <a:srgbClr val="000000"/>
                 </a:solidFill>
@@ -9739,14 +9739,14 @@
           </a:ln>
           <a:extLst>
             <a:ext uri="{909E8E84-426E-40dd-AFC4-6F175D3DCCD1}">
-              <a14:hiddenFill xmlns:a14="http://schemas.microsoft.com/office/drawing/2010/main" xmlns="">
+              <a14:hiddenFill xmlns="" xmlns:a14="http://schemas.microsoft.com/office/drawing/2010/main">
                 <a:solidFill>
                   <a:srgbClr val="FFFFFF"/>
                 </a:solidFill>
               </a14:hiddenFill>
             </a:ext>
             <a:ext uri="{91240B29-F687-4f45-9708-019B960494DF}">
-              <a14:hiddenLine xmlns:a14="http://schemas.microsoft.com/office/drawing/2010/main" xmlns="" w="9525">
+              <a14:hiddenLine xmlns="" xmlns:a14="http://schemas.microsoft.com/office/drawing/2010/main" w="9525">
                 <a:solidFill>
                   <a:srgbClr val="000000"/>
                 </a:solidFill>
@@ -11173,14 +11173,14 @@
           </a:ln>
           <a:extLst>
             <a:ext uri="{909E8E84-426E-40dd-AFC4-6F175D3DCCD1}">
-              <a14:hiddenFill xmlns:a14="http://schemas.microsoft.com/office/drawing/2010/main" xmlns="">
+              <a14:hiddenFill xmlns="" xmlns:a14="http://schemas.microsoft.com/office/drawing/2010/main">
                 <a:solidFill>
                   <a:srgbClr val="FFFFFF"/>
                 </a:solidFill>
               </a14:hiddenFill>
             </a:ext>
             <a:ext uri="{91240B29-F687-4f45-9708-019B960494DF}">
-              <a14:hiddenLine xmlns:a14="http://schemas.microsoft.com/office/drawing/2010/main" xmlns="" w="9525">
+              <a14:hiddenLine xmlns="" xmlns:a14="http://schemas.microsoft.com/office/drawing/2010/main" w="9525">
                 <a:solidFill>
                   <a:srgbClr val="000000"/>
                 </a:solidFill>
@@ -12514,14 +12514,14 @@
           </a:ln>
           <a:extLst>
             <a:ext uri="{909E8E84-426E-40dd-AFC4-6F175D3DCCD1}">
-              <a14:hiddenFill xmlns:a14="http://schemas.microsoft.com/office/drawing/2010/main" xmlns="">
+              <a14:hiddenFill xmlns="" xmlns:a14="http://schemas.microsoft.com/office/drawing/2010/main">
                 <a:solidFill>
                   <a:srgbClr val="FFFFFF"/>
                 </a:solidFill>
               </a14:hiddenFill>
             </a:ext>
             <a:ext uri="{91240B29-F687-4f45-9708-019B960494DF}">
-              <a14:hiddenLine xmlns:a14="http://schemas.microsoft.com/office/drawing/2010/main" xmlns="" w="9525">
+              <a14:hiddenLine xmlns="" xmlns:a14="http://schemas.microsoft.com/office/drawing/2010/main" w="9525">
                 <a:solidFill>
                   <a:srgbClr val="000000"/>
                 </a:solidFill>
@@ -13079,14 +13079,14 @@
           </a:ln>
           <a:extLst>
             <a:ext uri="{909E8E84-426E-40dd-AFC4-6F175D3DCCD1}">
-              <a14:hiddenFill xmlns:a14="http://schemas.microsoft.com/office/drawing/2010/main" xmlns="">
+              <a14:hiddenFill xmlns="" xmlns:a14="http://schemas.microsoft.com/office/drawing/2010/main">
                 <a:solidFill>
                   <a:srgbClr val="FFFFFF"/>
                 </a:solidFill>
               </a14:hiddenFill>
             </a:ext>
             <a:ext uri="{91240B29-F687-4f45-9708-019B960494DF}">
-              <a14:hiddenLine xmlns:a14="http://schemas.microsoft.com/office/drawing/2010/main" xmlns="" w="9525">
+              <a14:hiddenLine xmlns="" xmlns:a14="http://schemas.microsoft.com/office/drawing/2010/main" w="9525">
                 <a:solidFill>
                   <a:srgbClr val="000000"/>
                 </a:solidFill>
@@ -13653,14 +13653,14 @@
           </a:ln>
           <a:extLst>
             <a:ext uri="{909E8E84-426E-40dd-AFC4-6F175D3DCCD1}">
-              <a14:hiddenFill xmlns:a14="http://schemas.microsoft.com/office/drawing/2010/main" xmlns="">
+              <a14:hiddenFill xmlns="" xmlns:a14="http://schemas.microsoft.com/office/drawing/2010/main">
                 <a:solidFill>
                   <a:srgbClr val="FFFFFF"/>
                 </a:solidFill>
               </a14:hiddenFill>
             </a:ext>
             <a:ext uri="{91240B29-F687-4f45-9708-019B960494DF}">
-              <a14:hiddenLine xmlns:a14="http://schemas.microsoft.com/office/drawing/2010/main" xmlns="" w="9525">
+              <a14:hiddenLine xmlns="" xmlns:a14="http://schemas.microsoft.com/office/drawing/2010/main" w="9525">
                 <a:solidFill>
                   <a:srgbClr val="000000"/>
                 </a:solidFill>
@@ -14600,14 +14600,14 @@
           </a:ln>
           <a:extLst>
             <a:ext uri="{909E8E84-426E-40dd-AFC4-6F175D3DCCD1}">
-              <a14:hiddenFill xmlns:a14="http://schemas.microsoft.com/office/drawing/2010/main" xmlns="">
+              <a14:hiddenFill xmlns="" xmlns:a14="http://schemas.microsoft.com/office/drawing/2010/main">
                 <a:solidFill>
                   <a:srgbClr val="FFFFFF"/>
                 </a:solidFill>
               </a14:hiddenFill>
             </a:ext>
             <a:ext uri="{91240B29-F687-4f45-9708-019B960494DF}">
-              <a14:hiddenLine xmlns:a14="http://schemas.microsoft.com/office/drawing/2010/main" xmlns="" w="9525">
+              <a14:hiddenLine xmlns="" xmlns:a14="http://schemas.microsoft.com/office/drawing/2010/main" w="9525">
                 <a:solidFill>
                   <a:srgbClr val="000000"/>
                 </a:solidFill>
@@ -15362,14 +15362,14 @@
           </a:ln>
           <a:extLst>
             <a:ext uri="{909E8E84-426E-40dd-AFC4-6F175D3DCCD1}">
-              <a14:hiddenFill xmlns:a14="http://schemas.microsoft.com/office/drawing/2010/main" xmlns="">
+              <a14:hiddenFill xmlns="" xmlns:a14="http://schemas.microsoft.com/office/drawing/2010/main">
                 <a:solidFill>
                   <a:srgbClr val="FFFFFF"/>
                 </a:solidFill>
               </a14:hiddenFill>
             </a:ext>
             <a:ext uri="{91240B29-F687-4f45-9708-019B960494DF}">
-              <a14:hiddenLine xmlns:a14="http://schemas.microsoft.com/office/drawing/2010/main" xmlns="" w="9525">
+              <a14:hiddenLine xmlns="" xmlns:a14="http://schemas.microsoft.com/office/drawing/2010/main" w="9525">
                 <a:solidFill>
                   <a:srgbClr val="000000"/>
                 </a:solidFill>
@@ -20322,7 +20322,7 @@
         <p:spPr>
           <a:xfrm>
             <a:off x="4854421" y="3672883"/>
-            <a:ext cx="1565564" cy="540465"/>
+            <a:ext cx="1565564" cy="536817"/>
           </a:xfrm>
         </p:spPr>
         <p:txBody>
@@ -21980,7 +21980,7 @@
           <a:p>
             <a:r>
               <a:rPr lang="en-US" dirty="0"/>
-              <a:t>  - name: centos-7.3</a:t>
+              <a:t>  - name: centos-7</a:t>
             </a:r>
           </a:p>
         </p:txBody>
@@ -23180,7 +23180,7 @@
           <a:p>
             <a:r>
               <a:rPr lang="en-US" dirty="0"/>
-              <a:t>  - name: centos-7.3</a:t>
+              <a:t>  - name: centos-7</a:t>
             </a:r>
           </a:p>
         </p:txBody>
@@ -26456,35 +26456,13 @@
           <a:p>
             <a:r>
               <a:rPr lang="en-US" dirty="0"/>
-              <a:t>$$$$$$ Running legacy login for '</a:t>
-            </a:r>
-            <a:r>
-              <a:rPr lang="en-US" dirty="0" err="1"/>
-              <a:t>Docker</a:t>
-            </a:r>
-            <a:r>
-              <a:rPr lang="en-US" dirty="0"/>
-              <a:t>' Driver</a:t>
-            </a:r>
-          </a:p>
-          <a:p>
-            <a:r>
-              <a:rPr lang="en-US" dirty="0"/>
-              <a:t>Last login: Thu Feb 18 21:21:39 </a:t>
-            </a:r>
-            <a:r>
-              <a:rPr lang="is-IS" dirty="0"/>
-              <a:t>2017</a:t>
-            </a:r>
-            <a:r>
-              <a:rPr lang="en-US" dirty="0"/>
-              <a:t> from 172.17.42.1</a:t>
-            </a:r>
-          </a:p>
-          <a:p>
-            <a:r>
-              <a:rPr lang="en-US" dirty="0"/>
-              <a:t>[kitchen@4eae2dd9e741 ~]$</a:t>
+              <a:t>Last login: Fri Mar 23 15:48:26 2018 from 172.17.42.1</a:t>
+            </a:r>
+          </a:p>
+          <a:p>
+            <a:r>
+              <a:rPr lang="en-US" dirty="0"/>
+              <a:t>[kitchen@bc530336220c ~]$</a:t>
             </a:r>
           </a:p>
         </p:txBody>
@@ -26523,8 +26501,8 @@
         </p:nvSpPr>
         <p:spPr>
           <a:xfrm>
-            <a:off x="1127883" y="3318455"/>
-            <a:ext cx="14420850" cy="557213"/>
+            <a:off x="1122782" y="2842591"/>
+            <a:ext cx="14420850" cy="576470"/>
           </a:xfrm>
         </p:spPr>
         <p:txBody>
@@ -32146,6 +32124,15 @@
 </file>
 
 <file path=customXml/item1.xml><?xml version="1.0" encoding="utf-8"?>
+<?mso-contentType ?>
+<FormTemplates xmlns="http://schemas.microsoft.com/sharepoint/v3/contenttype/forms">
+  <Display>DocumentLibraryForm</Display>
+  <Edit>DocumentLibraryForm</Edit>
+  <New>DocumentLibraryForm</New>
+</FormTemplates>
+</file>
+
+<file path=customXml/item2.xml><?xml version="1.0" encoding="utf-8"?>
 <ct:contentTypeSchema xmlns:ct="http://schemas.microsoft.com/office/2006/metadata/contentType" xmlns:ma="http://schemas.microsoft.com/office/2006/metadata/properties/metaAttributes" ct:_="" ma:_="" ma:contentTypeName="Document" ma:contentTypeID="0x0101000812F700BE7F874999720E88173FE491" ma:contentTypeVersion="0" ma:contentTypeDescription="Create a new document." ma:contentTypeScope="" ma:versionID="3f79f408e2ca720b7aba6e0e32464d0c">
   <xsd:schema xmlns:xsd="http://www.w3.org/2001/XMLSchema" xmlns:xs="http://www.w3.org/2001/XMLSchema" xmlns:p="http://schemas.microsoft.com/office/2006/metadata/properties" xmlns:ns2="7bb5d761-a2ea-4873-95f7-7a6658fb3ef0" targetNamespace="http://schemas.microsoft.com/office/2006/metadata/properties" ma:root="true" ma:fieldsID="1e062cd38ba31e406bfc4340fbc7f87a" ns2:_="">
     <xsd:import namespace="7bb5d761-a2ea-4873-95f7-7a6658fb3ef0"/>
@@ -32290,16 +32277,19 @@
 </ct:contentTypeSchema>
 </file>
 
-<file path=customXml/item2.xml><?xml version="1.0" encoding="utf-8"?>
-<?mso-contentType ?>
-<FormTemplates xmlns="http://schemas.microsoft.com/sharepoint/v3/contenttype/forms">
-  <Display>DocumentLibraryForm</Display>
-  <Edit>DocumentLibraryForm</Edit>
-  <New>DocumentLibraryForm</New>
-</FormTemplates>
+<file path=customXml/item3.xml><?xml version="1.0" encoding="utf-8"?>
+<p:properties xmlns:p="http://schemas.microsoft.com/office/2006/metadata/properties" xmlns:xsi="http://www.w3.org/2001/XMLSchema-instance" xmlns:pc="http://schemas.microsoft.com/office/infopath/2007/PartnerControls">
+  <documentManagement>
+    <_dlc_DocId xmlns="7bb5d761-a2ea-4873-95f7-7a6658fb3ef0">M4CWTKMW727E-592-73</_dlc_DocId>
+    <_dlc_DocIdUrl xmlns="7bb5d761-a2ea-4873-95f7-7a6658fb3ef0">
+      <Url>https://kms.vci.local/marketing/team/_layouts/DocIdRedir.aspx?ID=M4CWTKMW727E-592-73</Url>
+      <Description>M4CWTKMW727E-592-73</Description>
+    </_dlc_DocIdUrl>
+  </documentManagement>
+</p:properties>
 </file>
 
-<file path=customXml/item3.xml><?xml version="1.0" encoding="utf-8"?>
+<file path=customXml/item4.xml><?xml version="1.0" encoding="utf-8"?>
 <?mso-contentType ?>
 <spe:Receivers xmlns:spe="http://schemas.microsoft.com/sharepoint/events">
   <Receiver>
@@ -32345,19 +32335,15 @@
 </spe:Receivers>
 </file>
 
-<file path=customXml/item4.xml><?xml version="1.0" encoding="utf-8"?>
-<p:properties xmlns:p="http://schemas.microsoft.com/office/2006/metadata/properties" xmlns:xsi="http://www.w3.org/2001/XMLSchema-instance" xmlns:pc="http://schemas.microsoft.com/office/infopath/2007/PartnerControls">
-  <documentManagement>
-    <_dlc_DocId xmlns="7bb5d761-a2ea-4873-95f7-7a6658fb3ef0">M4CWTKMW727E-592-73</_dlc_DocId>
-    <_dlc_DocIdUrl xmlns="7bb5d761-a2ea-4873-95f7-7a6658fb3ef0">
-      <Url>https://kms.vci.local/marketing/team/_layouts/DocIdRedir.aspx?ID=M4CWTKMW727E-592-73</Url>
-      <Description>M4CWTKMW727E-592-73</Description>
-    </_dlc_DocIdUrl>
-  </documentManagement>
-</p:properties>
+<file path=customXml/itemProps1.xml><?xml version="1.0" encoding="utf-8"?>
+<ds:datastoreItem xmlns:ds="http://schemas.openxmlformats.org/officeDocument/2006/customXml" ds:itemID="{5CDEB364-43EC-4510-9881-539C2A3FCE9E}">
+  <ds:schemaRefs>
+    <ds:schemaRef ds:uri="http://schemas.microsoft.com/sharepoint/v3/contenttype/forms"/>
+  </ds:schemaRefs>
+</ds:datastoreItem>
 </file>
 
-<file path=customXml/itemProps1.xml><?xml version="1.0" encoding="utf-8"?>
+<file path=customXml/itemProps2.xml><?xml version="1.0" encoding="utf-8"?>
 <ds:datastoreItem xmlns:ds="http://schemas.openxmlformats.org/officeDocument/2006/customXml" ds:itemID="{164479E5-0B02-49AC-B79E-EC1D6164DDD3}">
   <ds:schemaRefs>
     <ds:schemaRef ds:uri="http://schemas.microsoft.com/office/2006/metadata/contentType"/>
@@ -32375,23 +32361,7 @@
 </ds:datastoreItem>
 </file>
 
-<file path=customXml/itemProps2.xml><?xml version="1.0" encoding="utf-8"?>
-<ds:datastoreItem xmlns:ds="http://schemas.openxmlformats.org/officeDocument/2006/customXml" ds:itemID="{5CDEB364-43EC-4510-9881-539C2A3FCE9E}">
-  <ds:schemaRefs>
-    <ds:schemaRef ds:uri="http://schemas.microsoft.com/sharepoint/v3/contenttype/forms"/>
-  </ds:schemaRefs>
-</ds:datastoreItem>
-</file>
-
 <file path=customXml/itemProps3.xml><?xml version="1.0" encoding="utf-8"?>
-<ds:datastoreItem xmlns:ds="http://schemas.openxmlformats.org/officeDocument/2006/customXml" ds:itemID="{B13EBC30-FE27-4C6A-B723-23FC2188F7DC}">
-  <ds:schemaRefs>
-    <ds:schemaRef ds:uri="http://schemas.microsoft.com/sharepoint/events"/>
-  </ds:schemaRefs>
-</ds:datastoreItem>
-</file>
-
-<file path=customXml/itemProps4.xml><?xml version="1.0" encoding="utf-8"?>
 <ds:datastoreItem xmlns:ds="http://schemas.openxmlformats.org/officeDocument/2006/customXml" ds:itemID="{6921749B-AEB7-461B-845F-603CABD25259}">
   <ds:schemaRefs>
     <ds:schemaRef ds:uri="7bb5d761-a2ea-4873-95f7-7a6658fb3ef0"/>
@@ -32405,4 +32375,12 @@
     <ds:schemaRef ds:uri="http://www.w3.org/XML/1998/namespace"/>
   </ds:schemaRefs>
 </ds:datastoreItem>
+</file>
+
+<file path=customXml/itemProps4.xml><?xml version="1.0" encoding="utf-8"?>
+<ds:datastoreItem xmlns:ds="http://schemas.openxmlformats.org/officeDocument/2006/customXml" ds:itemID="{B13EBC30-FE27-4C6A-B723-23FC2188F7DC}">
+  <ds:schemaRefs>
+    <ds:schemaRef ds:uri="http://schemas.microsoft.com/sharepoint/events"/>
+  </ds:schemaRefs>
+</ds:datastoreItem>
 </file>
</xml_diff>

<commit_message>
added touchups to many slides, added missing instructor notes to Mod 15-16
</commit_message>
<xml_diff>
--- a/03-writing_a_test_first.pptx
+++ b/03-writing_a_test_first.pptx
@@ -13,10 +13,10 @@
   </p:handoutMasterIdLst>
   <p:sldIdLst>
     <p:sldId id="256" r:id="rId7"/>
-    <p:sldId id="296" r:id="rId8"/>
-    <p:sldId id="297" r:id="rId9"/>
-    <p:sldId id="299" r:id="rId10"/>
-    <p:sldId id="257" r:id="rId11"/>
+    <p:sldId id="257" r:id="rId8"/>
+    <p:sldId id="296" r:id="rId9"/>
+    <p:sldId id="297" r:id="rId10"/>
+    <p:sldId id="299" r:id="rId11"/>
     <p:sldId id="294" r:id="rId12"/>
     <p:sldId id="295" r:id="rId13"/>
     <p:sldId id="300" r:id="rId14"/>
@@ -333,7 +333,7 @@
               <a:pPr>
                 <a:defRPr/>
               </a:pPr>
-              <a:t>2018-03-23</a:t>
+              <a:t>2018-04-25</a:t>
             </a:fld>
             <a:endParaRPr lang="en-US" dirty="0"/>
           </a:p>
@@ -2338,95 +2338,41 @@
               <a:defRPr/>
             </a:pPr>
             <a:r>
-              <a:rPr lang="en-US" baseline="0" dirty="0"/>
-              <a:t>Test Driven Development (TDD) is a workflow that asks you to perform that act continually and repeatedly as you satisfy the requirements of the work you have chosen to perform.</a:t>
-            </a:r>
-          </a:p>
-          <a:p>
-            <a:pPr marL="0" marR="0" indent="0" algn="l" defTabSz="1217613" rtl="0" eaLnBrk="1" fontAlgn="base" latinLnBrk="0" hangingPunct="1">
-              <a:lnSpc>
-                <a:spcPct val="90000"/>
-              </a:lnSpc>
-              <a:spcBef>
-                <a:spcPct val="30000"/>
-              </a:spcBef>
-              <a:spcAft>
-                <a:spcPts val="450"/>
-              </a:spcAft>
-              <a:buClrTx/>
-              <a:buSzTx/>
-              <a:buFontTx/>
-              <a:buNone/>
-              <a:tabLst/>
-              <a:defRPr/>
-            </a:pPr>
-            <a:endParaRPr lang="en-US" baseline="0" dirty="0"/>
-          </a:p>
-          <a:p>
-            <a:pPr marL="0" marR="0" indent="0" algn="l" defTabSz="1217613" rtl="0" eaLnBrk="1" fontAlgn="base" latinLnBrk="0" hangingPunct="1">
-              <a:lnSpc>
-                <a:spcPct val="90000"/>
-              </a:lnSpc>
-              <a:spcBef>
-                <a:spcPct val="30000"/>
-              </a:spcBef>
-              <a:spcAft>
-                <a:spcPts val="450"/>
-              </a:spcAft>
-              <a:buClrTx/>
-              <a:buSzTx/>
-              <a:buFontTx/>
-              <a:buNone/>
-              <a:tabLst/>
-              <a:defRPr/>
-            </a:pPr>
-            <a:r>
-              <a:rPr lang="en-US" baseline="0" dirty="0"/>
-              <a:t>TDD generically focuses on the unit of software any level. It is the process of writing the test first, implementing the unit, and then verifying the implementation with the test that was written.</a:t>
-            </a:r>
-          </a:p>
-          <a:p>
-            <a:pPr marL="0" marR="0" indent="0" algn="l" defTabSz="1217613" rtl="0" eaLnBrk="1" fontAlgn="base" latinLnBrk="0" hangingPunct="1">
-              <a:lnSpc>
-                <a:spcPct val="90000"/>
-              </a:lnSpc>
-              <a:spcBef>
-                <a:spcPct val="30000"/>
-              </a:spcBef>
-              <a:spcAft>
-                <a:spcPts val="450"/>
-              </a:spcAft>
-              <a:buClrTx/>
-              <a:buSzTx/>
-              <a:buFontTx/>
-              <a:buNone/>
-              <a:tabLst/>
-              <a:defRPr/>
-            </a:pPr>
-            <a:endParaRPr lang="en-US" baseline="0" dirty="0"/>
-          </a:p>
-          <a:p>
-            <a:pPr marL="0" marR="0" indent="0" algn="l" defTabSz="1217613" rtl="0" eaLnBrk="1" fontAlgn="base" latinLnBrk="0" hangingPunct="1">
-              <a:lnSpc>
-                <a:spcPct val="90000"/>
-              </a:lnSpc>
-              <a:spcBef>
-                <a:spcPct val="30000"/>
-              </a:spcBef>
-              <a:spcAft>
-                <a:spcPts val="450"/>
-              </a:spcAft>
-              <a:buClrTx/>
-              <a:buSzTx/>
-              <a:buFontTx/>
-              <a:buNone/>
-              <a:tabLst/>
-              <a:defRPr/>
-            </a:pPr>
-            <a:r>
-              <a:rPr lang="en-US" baseline="0" dirty="0"/>
-              <a:t>A 'unit' of software is purposefully vague. This 'unit' is definable by the individuals developing the software. So the size of a 'unit of software' likely has different meanings to different individuals based on our backgrounds and experiences.</a:t>
-            </a:r>
+              <a:rPr lang="en-US" sz="1200" kern="1200" dirty="0">
+                <a:solidFill>
+                  <a:schemeClr val="tx1"/>
+                </a:solidFill>
+                <a:effectLst/>
+                <a:latin typeface="Arial" panose="020B0604020202020204" pitchFamily="34" charset="0"/>
+                <a:ea typeface="ＭＳ Ｐゴシック" charset="0"/>
+                <a:cs typeface="Arial" panose="020B0604020202020204" pitchFamily="34" charset="0"/>
+              </a:rPr>
+              <a:t>In this module you will learn how to use chef</a:t>
+            </a:r>
+            <a:r>
+              <a:rPr lang="en-US" sz="1200" kern="1200" baseline="0" dirty="0">
+                <a:solidFill>
+                  <a:schemeClr val="tx1"/>
+                </a:solidFill>
+                <a:effectLst/>
+                <a:latin typeface="Arial" panose="020B0604020202020204" pitchFamily="34" charset="0"/>
+                <a:ea typeface="ＭＳ Ｐゴシック" charset="0"/>
+                <a:cs typeface="Arial" panose="020B0604020202020204" pitchFamily="34" charset="0"/>
+              </a:rPr>
+              <a:t> to generate a cookbook, write an integration test first, use Test Kitchen to execute that test, and then implement a solution to make that test pass.</a:t>
+            </a:r>
+            <a:endParaRPr lang="en-US" sz="1200" kern="1200" dirty="0">
+              <a:solidFill>
+                <a:schemeClr val="tx1"/>
+              </a:solidFill>
+              <a:effectLst/>
+              <a:latin typeface="Arial" panose="020B0604020202020204" pitchFamily="34" charset="0"/>
+              <a:ea typeface="ＭＳ Ｐゴシック" charset="0"/>
+              <a:cs typeface="Arial" panose="020B0604020202020204" pitchFamily="34" charset="0"/>
+            </a:endParaRPr>
+          </a:p>
+          <a:p>
+            <a:endParaRPr lang="en-US" dirty="0"/>
           </a:p>
         </p:txBody>
       </p:sp>
@@ -2484,7 +2430,7 @@
     </p:spTree>
     <p:extLst>
       <p:ext uri="{BB962C8B-B14F-4D97-AF65-F5344CB8AC3E}">
-        <p14:creationId xmlns:p14="http://schemas.microsoft.com/office/powerpoint/2010/main" val="560814404"/>
+        <p14:creationId xmlns:p14="http://schemas.microsoft.com/office/powerpoint/2010/main" val="1276400645"/>
       </p:ext>
     </p:extLst>
   </p:cSld>
@@ -3853,7 +3799,7 @@
             </a:pPr>
             <a:r>
               <a:rPr lang="en-US" baseline="0" dirty="0"/>
-              <a:t>How you choose to express the requirements of that unit is the crux of Behavior Driven Development (BDD). Behavior-driven development specifies that tests of any unit of software should be specified in terms of the desired behavior of the unit. Expressing this desired behavior is often expressed in scenarios that are written in a Domain Specific Language (DSL).</a:t>
+              <a:t>Test Driven Development (TDD) is a workflow that asks you to perform that act continually and repeatedly as you satisfy the requirements of the work you have chosen to perform.</a:t>
             </a:r>
           </a:p>
           <a:p>
@@ -3896,7 +3842,50 @@
             </a:pPr>
             <a:r>
               <a:rPr lang="en-US" baseline="0" dirty="0"/>
-              <a:t>The cookbooks and recipes that you have written so far share quite a few similarities with BDD. In Chef, you express the desired state of the system through a DSL, resources, you define in recipes.</a:t>
+              <a:t>TDD generically focuses on the unit of software any level. It is the process of writing the test first, implementing the unit, and then verifying the implementation with the test that was written.</a:t>
+            </a:r>
+          </a:p>
+          <a:p>
+            <a:pPr marL="0" marR="0" indent="0" algn="l" defTabSz="1217613" rtl="0" eaLnBrk="1" fontAlgn="base" latinLnBrk="0" hangingPunct="1">
+              <a:lnSpc>
+                <a:spcPct val="90000"/>
+              </a:lnSpc>
+              <a:spcBef>
+                <a:spcPct val="30000"/>
+              </a:spcBef>
+              <a:spcAft>
+                <a:spcPts val="450"/>
+              </a:spcAft>
+              <a:buClrTx/>
+              <a:buSzTx/>
+              <a:buFontTx/>
+              <a:buNone/>
+              <a:tabLst/>
+              <a:defRPr/>
+            </a:pPr>
+            <a:endParaRPr lang="en-US" baseline="0" dirty="0"/>
+          </a:p>
+          <a:p>
+            <a:pPr marL="0" marR="0" indent="0" algn="l" defTabSz="1217613" rtl="0" eaLnBrk="1" fontAlgn="base" latinLnBrk="0" hangingPunct="1">
+              <a:lnSpc>
+                <a:spcPct val="90000"/>
+              </a:lnSpc>
+              <a:spcBef>
+                <a:spcPct val="30000"/>
+              </a:spcBef>
+              <a:spcAft>
+                <a:spcPts val="450"/>
+              </a:spcAft>
+              <a:buClrTx/>
+              <a:buSzTx/>
+              <a:buFontTx/>
+              <a:buNone/>
+              <a:tabLst/>
+              <a:defRPr/>
+            </a:pPr>
+            <a:r>
+              <a:rPr lang="en-US" baseline="0" dirty="0"/>
+              <a:t>A 'unit' of software is purposefully vague. This 'unit' is definable by the individuals developing the software. So the size of a 'unit of software' likely has different meanings to different individuals based on our backgrounds and experiences.</a:t>
             </a:r>
           </a:p>
         </p:txBody>
@@ -3955,7 +3944,7 @@
     </p:spTree>
     <p:extLst>
       <p:ext uri="{BB962C8B-B14F-4D97-AF65-F5344CB8AC3E}">
-        <p14:creationId xmlns:p14="http://schemas.microsoft.com/office/powerpoint/2010/main" val="1073903232"/>
+        <p14:creationId xmlns:p14="http://schemas.microsoft.com/office/powerpoint/2010/main" val="560814404"/>
       </p:ext>
     </p:extLst>
   </p:cSld>
@@ -5438,18 +5427,69 @@
           <a:bodyPr/>
           <a:lstStyle/>
           <a:p>
-            <a:r>
-              <a:rPr lang="en-US" dirty="0"/>
-              <a:t>TDD is a workflow process: Add a test; Run the test expecting failure; Add code; Run the test expecting success. Refactor.</a:t>
-            </a:r>
-          </a:p>
-          <a:p>
-            <a:endParaRPr lang="en-US" dirty="0"/>
-          </a:p>
-          <a:p>
-            <a:r>
-              <a:rPr lang="en-US" dirty="0"/>
-              <a:t>BDD influences the language we use to write the tests and how we focus on tests that matter. The activities within this module focus on the process of taking requirements, expressing them as expectations, choosing one implementation to meet these expectations, and then verifying we have met these expectations.</a:t>
+            <a:pPr marL="0" marR="0" indent="0" algn="l" defTabSz="1217613" rtl="0" eaLnBrk="1" fontAlgn="base" latinLnBrk="0" hangingPunct="1">
+              <a:lnSpc>
+                <a:spcPct val="90000"/>
+              </a:lnSpc>
+              <a:spcBef>
+                <a:spcPct val="30000"/>
+              </a:spcBef>
+              <a:spcAft>
+                <a:spcPts val="450"/>
+              </a:spcAft>
+              <a:buClrTx/>
+              <a:buSzTx/>
+              <a:buFontTx/>
+              <a:buNone/>
+              <a:tabLst/>
+              <a:defRPr/>
+            </a:pPr>
+            <a:r>
+              <a:rPr lang="en-US" baseline="0" dirty="0"/>
+              <a:t>How you choose to express the requirements of that unit is the crux of Behavior Driven Development (BDD). Behavior-driven development specifies that tests of any unit of software should be specified in terms of the desired behavior of the unit. Expressing this desired behavior is often expressed in scenarios that are written in a Domain Specific Language (DSL).</a:t>
+            </a:r>
+          </a:p>
+          <a:p>
+            <a:pPr marL="0" marR="0" indent="0" algn="l" defTabSz="1217613" rtl="0" eaLnBrk="1" fontAlgn="base" latinLnBrk="0" hangingPunct="1">
+              <a:lnSpc>
+                <a:spcPct val="90000"/>
+              </a:lnSpc>
+              <a:spcBef>
+                <a:spcPct val="30000"/>
+              </a:spcBef>
+              <a:spcAft>
+                <a:spcPts val="450"/>
+              </a:spcAft>
+              <a:buClrTx/>
+              <a:buSzTx/>
+              <a:buFontTx/>
+              <a:buNone/>
+              <a:tabLst/>
+              <a:defRPr/>
+            </a:pPr>
+            <a:endParaRPr lang="en-US" baseline="0" dirty="0"/>
+          </a:p>
+          <a:p>
+            <a:pPr marL="0" marR="0" indent="0" algn="l" defTabSz="1217613" rtl="0" eaLnBrk="1" fontAlgn="base" latinLnBrk="0" hangingPunct="1">
+              <a:lnSpc>
+                <a:spcPct val="90000"/>
+              </a:lnSpc>
+              <a:spcBef>
+                <a:spcPct val="30000"/>
+              </a:spcBef>
+              <a:spcAft>
+                <a:spcPts val="450"/>
+              </a:spcAft>
+              <a:buClrTx/>
+              <a:buSzTx/>
+              <a:buFontTx/>
+              <a:buNone/>
+              <a:tabLst/>
+              <a:defRPr/>
+            </a:pPr>
+            <a:r>
+              <a:rPr lang="en-US" baseline="0" dirty="0"/>
+              <a:t>The cookbooks and recipes that you have written so far share quite a few similarities with BDD. In Chef, you express the desired state of the system through a DSL, resources, you define in recipes.</a:t>
             </a:r>
           </a:p>
         </p:txBody>
@@ -5508,7 +5548,7 @@
     </p:spTree>
     <p:extLst>
       <p:ext uri="{BB962C8B-B14F-4D97-AF65-F5344CB8AC3E}">
-        <p14:creationId xmlns:p14="http://schemas.microsoft.com/office/powerpoint/2010/main" val="1289573995"/>
+        <p14:creationId xmlns:p14="http://schemas.microsoft.com/office/powerpoint/2010/main" val="1073903232"/>
       </p:ext>
     </p:extLst>
   </p:cSld>
@@ -6825,59 +6865,19 @@
           <a:bodyPr/>
           <a:lstStyle/>
           <a:p>
-            <a:pPr marL="0" marR="0" indent="0" algn="l" defTabSz="1217613" rtl="0" eaLnBrk="1" fontAlgn="base" latinLnBrk="0" hangingPunct="1">
-              <a:lnSpc>
-                <a:spcPct val="90000"/>
-              </a:lnSpc>
-              <a:spcBef>
-                <a:spcPct val="30000"/>
-              </a:spcBef>
-              <a:spcAft>
-                <a:spcPts val="450"/>
-              </a:spcAft>
-              <a:buClrTx/>
-              <a:buSzTx/>
-              <a:buFontTx/>
-              <a:buNone/>
-              <a:tabLst/>
-              <a:defRPr/>
-            </a:pPr>
-            <a:r>
-              <a:rPr lang="en-US" sz="1200" kern="1200" dirty="0">
-                <a:solidFill>
-                  <a:schemeClr val="tx1"/>
-                </a:solidFill>
-                <a:effectLst/>
-                <a:latin typeface="Arial" panose="020B0604020202020204" pitchFamily="34" charset="0"/>
-                <a:ea typeface="ＭＳ Ｐゴシック" charset="0"/>
-                <a:cs typeface="Arial" panose="020B0604020202020204" pitchFamily="34" charset="0"/>
-              </a:rPr>
-              <a:t>In this module you will learn how to use chef</a:t>
-            </a:r>
-            <a:r>
-              <a:rPr lang="en-US" sz="1200" kern="1200" baseline="0" dirty="0">
-                <a:solidFill>
-                  <a:schemeClr val="tx1"/>
-                </a:solidFill>
-                <a:effectLst/>
-                <a:latin typeface="Arial" panose="020B0604020202020204" pitchFamily="34" charset="0"/>
-                <a:ea typeface="ＭＳ Ｐゴシック" charset="0"/>
-                <a:cs typeface="Arial" panose="020B0604020202020204" pitchFamily="34" charset="0"/>
-              </a:rPr>
-              <a:t> to generate a cookbook, write an integration test first, use Test Kitchen to execute that test, and then implement a solution to make that test pass.</a:t>
-            </a:r>
-            <a:endParaRPr lang="en-US" sz="1200" kern="1200" dirty="0">
-              <a:solidFill>
-                <a:schemeClr val="tx1"/>
-              </a:solidFill>
-              <a:effectLst/>
-              <a:latin typeface="Arial" panose="020B0604020202020204" pitchFamily="34" charset="0"/>
-              <a:ea typeface="ＭＳ Ｐゴシック" charset="0"/>
-              <a:cs typeface="Arial" panose="020B0604020202020204" pitchFamily="34" charset="0"/>
-            </a:endParaRPr>
+            <a:r>
+              <a:rPr lang="en-US" dirty="0"/>
+              <a:t>TDD is a workflow process: Add a test; Run the test expecting failure; Add code; Run the test expecting success. Refactor.</a:t>
+            </a:r>
           </a:p>
           <a:p>
             <a:endParaRPr lang="en-US" dirty="0"/>
+          </a:p>
+          <a:p>
+            <a:r>
+              <a:rPr lang="en-US" dirty="0"/>
+              <a:t>BDD influences the language we use to write the tests and how we focus on tests that matter. The activities within this module focus on the process of taking requirements, expressing them as expectations, choosing one implementation to meet these expectations, and then verifying we have met these expectations.</a:t>
+            </a:r>
           </a:p>
         </p:txBody>
       </p:sp>
@@ -6935,7 +6935,7 @@
     </p:spTree>
     <p:extLst>
       <p:ext uri="{BB962C8B-B14F-4D97-AF65-F5344CB8AC3E}">
-        <p14:creationId xmlns:p14="http://schemas.microsoft.com/office/powerpoint/2010/main" val="1276400645"/>
+        <p14:creationId xmlns:p14="http://schemas.microsoft.com/office/powerpoint/2010/main" val="1289573995"/>
       </p:ext>
     </p:extLst>
   </p:cSld>
@@ -9086,14 +9086,14 @@
           </a:ln>
           <a:extLst>
             <a:ext uri="{909E8E84-426E-40dd-AFC4-6F175D3DCCD1}">
-              <a14:hiddenFill xmlns="" xmlns:a14="http://schemas.microsoft.com/office/drawing/2010/main">
+              <a14:hiddenFill xmlns:a14="http://schemas.microsoft.com/office/drawing/2010/main" xmlns="">
                 <a:solidFill>
                   <a:srgbClr val="FFFFFF"/>
                 </a:solidFill>
               </a14:hiddenFill>
             </a:ext>
             <a:ext uri="{91240B29-F687-4f45-9708-019B960494DF}">
-              <a14:hiddenLine xmlns="" xmlns:a14="http://schemas.microsoft.com/office/drawing/2010/main" w="9525">
+              <a14:hiddenLine xmlns:a14="http://schemas.microsoft.com/office/drawing/2010/main" xmlns="" w="9525">
                 <a:solidFill>
                   <a:srgbClr val="000000"/>
                 </a:solidFill>
@@ -9241,14 +9241,14 @@
           </a:ln>
           <a:extLst>
             <a:ext uri="{909E8E84-426E-40dd-AFC4-6F175D3DCCD1}">
-              <a14:hiddenFill xmlns="" xmlns:a14="http://schemas.microsoft.com/office/drawing/2010/main">
+              <a14:hiddenFill xmlns:a14="http://schemas.microsoft.com/office/drawing/2010/main" xmlns="">
                 <a:solidFill>
                   <a:srgbClr val="FFFFFF"/>
                 </a:solidFill>
               </a14:hiddenFill>
             </a:ext>
             <a:ext uri="{91240B29-F687-4f45-9708-019B960494DF}">
-              <a14:hiddenLine xmlns="" xmlns:a14="http://schemas.microsoft.com/office/drawing/2010/main" w="9525">
+              <a14:hiddenLine xmlns:a14="http://schemas.microsoft.com/office/drawing/2010/main" xmlns="" w="9525">
                 <a:solidFill>
                   <a:srgbClr val="000000"/>
                 </a:solidFill>
@@ -9739,14 +9739,14 @@
           </a:ln>
           <a:extLst>
             <a:ext uri="{909E8E84-426E-40dd-AFC4-6F175D3DCCD1}">
-              <a14:hiddenFill xmlns="" xmlns:a14="http://schemas.microsoft.com/office/drawing/2010/main">
+              <a14:hiddenFill xmlns:a14="http://schemas.microsoft.com/office/drawing/2010/main" xmlns="">
                 <a:solidFill>
                   <a:srgbClr val="FFFFFF"/>
                 </a:solidFill>
               </a14:hiddenFill>
             </a:ext>
             <a:ext uri="{91240B29-F687-4f45-9708-019B960494DF}">
-              <a14:hiddenLine xmlns="" xmlns:a14="http://schemas.microsoft.com/office/drawing/2010/main" w="9525">
+              <a14:hiddenLine xmlns:a14="http://schemas.microsoft.com/office/drawing/2010/main" xmlns="" w="9525">
                 <a:solidFill>
                   <a:srgbClr val="000000"/>
                 </a:solidFill>
@@ -11173,14 +11173,14 @@
           </a:ln>
           <a:extLst>
             <a:ext uri="{909E8E84-426E-40dd-AFC4-6F175D3DCCD1}">
-              <a14:hiddenFill xmlns="" xmlns:a14="http://schemas.microsoft.com/office/drawing/2010/main">
+              <a14:hiddenFill xmlns:a14="http://schemas.microsoft.com/office/drawing/2010/main" xmlns="">
                 <a:solidFill>
                   <a:srgbClr val="FFFFFF"/>
                 </a:solidFill>
               </a14:hiddenFill>
             </a:ext>
             <a:ext uri="{91240B29-F687-4f45-9708-019B960494DF}">
-              <a14:hiddenLine xmlns="" xmlns:a14="http://schemas.microsoft.com/office/drawing/2010/main" w="9525">
+              <a14:hiddenLine xmlns:a14="http://schemas.microsoft.com/office/drawing/2010/main" xmlns="" w="9525">
                 <a:solidFill>
                   <a:srgbClr val="000000"/>
                 </a:solidFill>
@@ -12514,14 +12514,14 @@
           </a:ln>
           <a:extLst>
             <a:ext uri="{909E8E84-426E-40dd-AFC4-6F175D3DCCD1}">
-              <a14:hiddenFill xmlns="" xmlns:a14="http://schemas.microsoft.com/office/drawing/2010/main">
+              <a14:hiddenFill xmlns:a14="http://schemas.microsoft.com/office/drawing/2010/main" xmlns="">
                 <a:solidFill>
                   <a:srgbClr val="FFFFFF"/>
                 </a:solidFill>
               </a14:hiddenFill>
             </a:ext>
             <a:ext uri="{91240B29-F687-4f45-9708-019B960494DF}">
-              <a14:hiddenLine xmlns="" xmlns:a14="http://schemas.microsoft.com/office/drawing/2010/main" w="9525">
+              <a14:hiddenLine xmlns:a14="http://schemas.microsoft.com/office/drawing/2010/main" xmlns="" w="9525">
                 <a:solidFill>
                   <a:srgbClr val="000000"/>
                 </a:solidFill>
@@ -13079,14 +13079,14 @@
           </a:ln>
           <a:extLst>
             <a:ext uri="{909E8E84-426E-40dd-AFC4-6F175D3DCCD1}">
-              <a14:hiddenFill xmlns="" xmlns:a14="http://schemas.microsoft.com/office/drawing/2010/main">
+              <a14:hiddenFill xmlns:a14="http://schemas.microsoft.com/office/drawing/2010/main" xmlns="">
                 <a:solidFill>
                   <a:srgbClr val="FFFFFF"/>
                 </a:solidFill>
               </a14:hiddenFill>
             </a:ext>
             <a:ext uri="{91240B29-F687-4f45-9708-019B960494DF}">
-              <a14:hiddenLine xmlns="" xmlns:a14="http://schemas.microsoft.com/office/drawing/2010/main" w="9525">
+              <a14:hiddenLine xmlns:a14="http://schemas.microsoft.com/office/drawing/2010/main" xmlns="" w="9525">
                 <a:solidFill>
                   <a:srgbClr val="000000"/>
                 </a:solidFill>
@@ -13653,14 +13653,14 @@
           </a:ln>
           <a:extLst>
             <a:ext uri="{909E8E84-426E-40dd-AFC4-6F175D3DCCD1}">
-              <a14:hiddenFill xmlns="" xmlns:a14="http://schemas.microsoft.com/office/drawing/2010/main">
+              <a14:hiddenFill xmlns:a14="http://schemas.microsoft.com/office/drawing/2010/main" xmlns="">
                 <a:solidFill>
                   <a:srgbClr val="FFFFFF"/>
                 </a:solidFill>
               </a14:hiddenFill>
             </a:ext>
             <a:ext uri="{91240B29-F687-4f45-9708-019B960494DF}">
-              <a14:hiddenLine xmlns="" xmlns:a14="http://schemas.microsoft.com/office/drawing/2010/main" w="9525">
+              <a14:hiddenLine xmlns:a14="http://schemas.microsoft.com/office/drawing/2010/main" xmlns="" w="9525">
                 <a:solidFill>
                   <a:srgbClr val="000000"/>
                 </a:solidFill>
@@ -14600,14 +14600,14 @@
           </a:ln>
           <a:extLst>
             <a:ext uri="{909E8E84-426E-40dd-AFC4-6F175D3DCCD1}">
-              <a14:hiddenFill xmlns="" xmlns:a14="http://schemas.microsoft.com/office/drawing/2010/main">
+              <a14:hiddenFill xmlns:a14="http://schemas.microsoft.com/office/drawing/2010/main" xmlns="">
                 <a:solidFill>
                   <a:srgbClr val="FFFFFF"/>
                 </a:solidFill>
               </a14:hiddenFill>
             </a:ext>
             <a:ext uri="{91240B29-F687-4f45-9708-019B960494DF}">
-              <a14:hiddenLine xmlns="" xmlns:a14="http://schemas.microsoft.com/office/drawing/2010/main" w="9525">
+              <a14:hiddenLine xmlns:a14="http://schemas.microsoft.com/office/drawing/2010/main" xmlns="" w="9525">
                 <a:solidFill>
                   <a:srgbClr val="000000"/>
                 </a:solidFill>
@@ -15362,14 +15362,14 @@
           </a:ln>
           <a:extLst>
             <a:ext uri="{909E8E84-426E-40dd-AFC4-6F175D3DCCD1}">
-              <a14:hiddenFill xmlns="" xmlns:a14="http://schemas.microsoft.com/office/drawing/2010/main">
+              <a14:hiddenFill xmlns:a14="http://schemas.microsoft.com/office/drawing/2010/main" xmlns="">
                 <a:solidFill>
                   <a:srgbClr val="FFFFFF"/>
                 </a:solidFill>
               </a14:hiddenFill>
             </a:ext>
             <a:ext uri="{91240B29-F687-4f45-9708-019B960494DF}">
-              <a14:hiddenLine xmlns="" xmlns:a14="http://schemas.microsoft.com/office/drawing/2010/main" w="9525">
+              <a14:hiddenLine xmlns:a14="http://schemas.microsoft.com/office/drawing/2010/main" xmlns="" w="9525">
                 <a:solidFill>
                   <a:srgbClr val="000000"/>
                 </a:solidFill>
@@ -19835,36 +19835,12 @@
       </p:grpSpPr>
       <p:sp>
         <p:nvSpPr>
-          <p:cNvPr id="4" name="Title 3"/>
-          <p:cNvSpPr>
-            <a:spLocks noGrp="1"/>
-          </p:cNvSpPr>
-          <p:nvPr>
-            <p:ph type="ctrTitle"/>
-          </p:nvPr>
-        </p:nvSpPr>
-        <p:spPr/>
-        <p:txBody>
-          <a:bodyPr>
-            <a:normAutofit fontScale="90000"/>
-          </a:bodyPr>
-          <a:lstStyle/>
-          <a:p>
-            <a:r>
-              <a:rPr lang="en-US" dirty="0"/>
-              <a:t>Test Driven Development</a:t>
-            </a:r>
-          </a:p>
-        </p:txBody>
-      </p:sp>
-      <p:sp>
-        <p:nvSpPr>
-          <p:cNvPr id="5" name="Subtitle 4"/>
-          <p:cNvSpPr>
-            <a:spLocks noGrp="1"/>
-          </p:cNvSpPr>
-          <p:nvPr>
-            <p:ph type="subTitle" idx="1"/>
+          <p:cNvPr id="2" name="Title 1"/>
+          <p:cNvSpPr>
+            <a:spLocks noGrp="1"/>
+          </p:cNvSpPr>
+          <p:nvPr>
+            <p:ph type="title"/>
           </p:nvPr>
         </p:nvSpPr>
         <p:spPr/>
@@ -19872,56 +19848,72 @@
           <a:bodyPr/>
           <a:lstStyle/>
           <a:p>
-            <a:pPr marL="514350" indent="-514350">
-              <a:buFont typeface="+mj-lt"/>
-              <a:buAutoNum type="arabicPeriod"/>
+            <a:r>
+              <a:rPr lang="en-US" dirty="0"/>
+              <a:t>Objectives</a:t>
+            </a:r>
+          </a:p>
+        </p:txBody>
+      </p:sp>
+      <p:sp>
+        <p:nvSpPr>
+          <p:cNvPr id="3" name="Text Placeholder 2"/>
+          <p:cNvSpPr>
+            <a:spLocks noGrp="1"/>
+          </p:cNvSpPr>
+          <p:nvPr>
+            <p:ph type="body" sz="quarter" idx="12"/>
+          </p:nvPr>
+        </p:nvSpPr>
+        <p:spPr/>
+        <p:txBody>
+          <a:bodyPr/>
+          <a:lstStyle/>
+          <a:p>
+            <a:r>
+              <a:rPr lang="en-US" dirty="0"/>
+              <a:t>After completing this module, you should be able to:</a:t>
+            </a:r>
+          </a:p>
+          <a:p>
+            <a:endParaRPr lang="en-US" dirty="0"/>
+          </a:p>
+          <a:p>
+            <a:pPr marL="457200" indent="-457200">
+              <a:buFont typeface="Wingdings" charset="2"/>
+              <a:buChar char="Ø"/>
             </a:pPr>
             <a:r>
               <a:rPr lang="en-US" dirty="0"/>
-              <a:t>Define a test set for the unit first</a:t>
-            </a:r>
-          </a:p>
-          <a:p>
-            <a:pPr marL="514350" indent="-514350">
-              <a:buFont typeface="+mj-lt"/>
-              <a:buAutoNum type="arabicPeriod"/>
+              <a:t>Write an integration test</a:t>
+            </a:r>
+          </a:p>
+          <a:p>
+            <a:pPr marL="457200" indent="-457200">
+              <a:buFont typeface="Wingdings" charset="2"/>
+              <a:buChar char="Ø"/>
             </a:pPr>
             <a:r>
               <a:rPr lang="en-US" dirty="0"/>
-              <a:t>Then implement the unit</a:t>
-            </a:r>
-          </a:p>
-          <a:p>
-            <a:pPr marL="514350" indent="-514350">
-              <a:buFont typeface="+mj-lt"/>
-              <a:buAutoNum type="arabicPeriod"/>
+              <a:t>Use Test Kitchen to create, converge, and verify a recipe</a:t>
+            </a:r>
+          </a:p>
+          <a:p>
+            <a:pPr marL="457200" indent="-457200">
+              <a:buFont typeface="Wingdings" charset="2"/>
+              <a:buChar char="Ø"/>
             </a:pPr>
             <a:r>
               <a:rPr lang="en-US" dirty="0"/>
-              <a:t>Finally verify that the implementation of the unit makes the tests </a:t>
-            </a:r>
-            <a:r>
-              <a:rPr lang="en-US"/>
-              <a:t>succeed.</a:t>
-            </a:r>
-          </a:p>
-          <a:p>
-            <a:pPr marL="514350" indent="-514350">
-              <a:buFont typeface="+mj-lt"/>
-              <a:buAutoNum type="arabicPeriod"/>
-            </a:pPr>
-            <a:r>
-              <a:rPr lang="en-US"/>
-              <a:t>Refactor</a:t>
-            </a:r>
-            <a:endParaRPr lang="en-US" dirty="0"/>
+              <a:t>Develop a cookbook with a test-driven approach</a:t>
+            </a:r>
           </a:p>
         </p:txBody>
       </p:sp>
     </p:spTree>
     <p:extLst>
       <p:ext uri="{BB962C8B-B14F-4D97-AF65-F5344CB8AC3E}">
-        <p14:creationId xmlns:p14="http://schemas.microsoft.com/office/powerpoint/2010/main" val="1229887400"/>
+        <p14:creationId xmlns:p14="http://schemas.microsoft.com/office/powerpoint/2010/main" val="3816834146"/>
       </p:ext>
     </p:extLst>
   </p:cSld>
@@ -22115,7 +22107,7 @@
       </p:grpSpPr>
       <p:sp>
         <p:nvSpPr>
-          <p:cNvPr id="2" name="Title 1"/>
+          <p:cNvPr id="4" name="Title 3"/>
           <p:cNvSpPr>
             <a:spLocks noGrp="1"/>
           </p:cNvSpPr>
@@ -22126,20 +22118,20 @@
         <p:spPr/>
         <p:txBody>
           <a:bodyPr>
-            <a:noAutofit/>
+            <a:normAutofit fontScale="90000"/>
           </a:bodyPr>
           <a:lstStyle/>
           <a:p>
             <a:r>
-              <a:rPr lang="en-US" sz="5400" dirty="0"/>
-              <a:t>Behavior Driven Development (BDD)</a:t>
-            </a:r>
-          </a:p>
-        </p:txBody>
-      </p:sp>
-      <p:sp>
-        <p:nvSpPr>
-          <p:cNvPr id="3" name="Subtitle 2"/>
+              <a:rPr lang="en-US" dirty="0"/>
+              <a:t>Test Driven Development</a:t>
+            </a:r>
+          </a:p>
+        </p:txBody>
+      </p:sp>
+      <p:sp>
+        <p:nvSpPr>
+          <p:cNvPr id="5" name="Subtitle 4"/>
           <p:cNvSpPr>
             <a:spLocks noGrp="1"/>
           </p:cNvSpPr>
@@ -22147,67 +22139,61 @@
             <p:ph type="subTitle" idx="1"/>
           </p:nvPr>
         </p:nvSpPr>
-        <p:spPr>
-          <a:xfrm>
-            <a:off x="1671638" y="3271839"/>
-            <a:ext cx="12319000" cy="3919376"/>
-          </a:xfrm>
-        </p:spPr>
+        <p:spPr/>
         <p:txBody>
           <a:bodyPr/>
           <a:lstStyle/>
           <a:p>
-            <a:r>
-              <a:rPr lang="en-US" dirty="0"/>
-              <a:t>Behavior-driven development (BDD) specifies that tests of any unit of software should be specified in terms of the desired behavior of the unit.</a:t>
-            </a:r>
-            <a:endParaRPr lang="en-US" baseline="30000" dirty="0"/>
-          </a:p>
-          <a:p>
-            <a:endParaRPr lang="en-US" baseline="30000" dirty="0"/>
-          </a:p>
-          <a:p>
-            <a:r>
-              <a:rPr lang="en-US" dirty="0"/>
-              <a:t>Borrowing from </a:t>
-            </a:r>
-            <a:r>
-              <a:rPr lang="en-US" dirty="0">
-                <a:hlinkClick r:id="rId3" tooltip="Agile software development"/>
-              </a:rPr>
-              <a:t>agile software development</a:t>
-            </a:r>
-            <a:r>
-              <a:rPr lang="en-US" dirty="0"/>
-              <a:t> the "desired behavior" in this case consists of the requirements set by the business — that is, the desired behavior that has </a:t>
-            </a:r>
-            <a:r>
-              <a:rPr lang="en-US" dirty="0">
-                <a:hlinkClick r:id="rId4" tooltip="Business value"/>
-              </a:rPr>
-              <a:t>business value</a:t>
-            </a:r>
-            <a:r>
-              <a:rPr lang="en-US" dirty="0"/>
-              <a:t> for whatever entity commissioned the software unit under construction.</a:t>
-            </a:r>
-            <a:endParaRPr lang="en-US" baseline="30000" dirty="0"/>
-          </a:p>
-          <a:p>
-            <a:endParaRPr lang="en-US" baseline="30000" dirty="0"/>
-          </a:p>
-          <a:p>
-            <a:r>
-              <a:rPr lang="en-US" dirty="0"/>
-              <a:t>Within BDD practice, this is referred to as BDD being an "outside-in" activity.</a:t>
-            </a:r>
+            <a:pPr marL="514350" indent="-514350">
+              <a:buFont typeface="+mj-lt"/>
+              <a:buAutoNum type="arabicPeriod"/>
+            </a:pPr>
+            <a:r>
+              <a:rPr lang="en-US" dirty="0"/>
+              <a:t>Define a test set for the unit first</a:t>
+            </a:r>
+          </a:p>
+          <a:p>
+            <a:pPr marL="514350" indent="-514350">
+              <a:buFont typeface="+mj-lt"/>
+              <a:buAutoNum type="arabicPeriod"/>
+            </a:pPr>
+            <a:r>
+              <a:rPr lang="en-US" dirty="0"/>
+              <a:t>Then implement the unit</a:t>
+            </a:r>
+          </a:p>
+          <a:p>
+            <a:pPr marL="514350" indent="-514350">
+              <a:buFont typeface="+mj-lt"/>
+              <a:buAutoNum type="arabicPeriod"/>
+            </a:pPr>
+            <a:r>
+              <a:rPr lang="en-US" dirty="0"/>
+              <a:t>Finally verify that the implementation of the unit makes the tests </a:t>
+            </a:r>
+            <a:r>
+              <a:rPr lang="en-US"/>
+              <a:t>succeed.</a:t>
+            </a:r>
+          </a:p>
+          <a:p>
+            <a:pPr marL="514350" indent="-514350">
+              <a:buFont typeface="+mj-lt"/>
+              <a:buAutoNum type="arabicPeriod"/>
+            </a:pPr>
+            <a:r>
+              <a:rPr lang="en-US"/>
+              <a:t>Refactor</a:t>
+            </a:r>
+            <a:endParaRPr lang="en-US" dirty="0"/>
           </a:p>
         </p:txBody>
       </p:sp>
     </p:spTree>
     <p:extLst>
       <p:ext uri="{BB962C8B-B14F-4D97-AF65-F5344CB8AC3E}">
-        <p14:creationId xmlns:p14="http://schemas.microsoft.com/office/powerpoint/2010/main" val="532097225"/>
+        <p14:creationId xmlns:p14="http://schemas.microsoft.com/office/powerpoint/2010/main" val="1229887400"/>
       </p:ext>
     </p:extLst>
   </p:cSld>
@@ -23097,7 +23083,7 @@
         <p:spPr/>
         <p:txBody>
           <a:bodyPr>
-            <a:normAutofit fontScale="92500" lnSpcReduction="10000"/>
+            <a:normAutofit fontScale="92500" lnSpcReduction="20000"/>
           </a:bodyPr>
           <a:lstStyle/>
           <a:p>
@@ -26136,13 +26122,13 @@
         <p:spPr/>
         <p:txBody>
           <a:bodyPr>
-            <a:normAutofit fontScale="90000"/>
+            <a:noAutofit/>
           </a:bodyPr>
           <a:lstStyle/>
           <a:p>
             <a:r>
-              <a:rPr lang="en-US" dirty="0"/>
-              <a:t>TDD and BDD</a:t>
+              <a:rPr lang="en-US" sz="5400" dirty="0"/>
+              <a:t>Behavior Driven Development (BDD)</a:t>
             </a:r>
           </a:p>
         </p:txBody>
@@ -26157,31 +26143,59 @@
             <p:ph type="subTitle" idx="1"/>
           </p:nvPr>
         </p:nvSpPr>
-        <p:spPr/>
+        <p:spPr>
+          <a:xfrm>
+            <a:off x="1671638" y="3271839"/>
+            <a:ext cx="12319000" cy="3919376"/>
+          </a:xfrm>
+        </p:spPr>
         <p:txBody>
           <a:bodyPr/>
           <a:lstStyle/>
           <a:p>
             <a:r>
-              <a:rPr lang="en-US" sz="3200" b="1" dirty="0"/>
-              <a:t>TDD </a:t>
-            </a:r>
-            <a:r>
-              <a:rPr lang="en-US" sz="3200" dirty="0"/>
-              <a:t>is a workflow process.</a:t>
-            </a:r>
-          </a:p>
-          <a:p>
-            <a:endParaRPr lang="en-US" sz="3200" b="1" dirty="0"/>
-          </a:p>
-          <a:p>
-            <a:r>
-              <a:rPr lang="en-US" sz="3200" b="1" dirty="0"/>
-              <a:t>BDD </a:t>
-            </a:r>
-            <a:r>
-              <a:rPr lang="en-US" sz="3200" dirty="0"/>
-              <a:t>influences the language we use to write tests and how we focus on the tests that matter.</a:t>
+              <a:rPr lang="en-US" dirty="0"/>
+              <a:t>Behavior-driven development (BDD) specifies that tests of any unit of software should be specified in terms of the desired behavior of the unit.</a:t>
+            </a:r>
+            <a:endParaRPr lang="en-US" baseline="30000" dirty="0"/>
+          </a:p>
+          <a:p>
+            <a:endParaRPr lang="en-US" baseline="30000" dirty="0"/>
+          </a:p>
+          <a:p>
+            <a:r>
+              <a:rPr lang="en-US" dirty="0"/>
+              <a:t>Borrowing from </a:t>
+            </a:r>
+            <a:r>
+              <a:rPr lang="en-US" dirty="0">
+                <a:hlinkClick r:id="rId3" tooltip="Agile software development"/>
+              </a:rPr>
+              <a:t>agile software development</a:t>
+            </a:r>
+            <a:r>
+              <a:rPr lang="en-US" dirty="0"/>
+              <a:t> the "desired behavior" in this case consists of the requirements set by the business — that is, the desired behavior that has </a:t>
+            </a:r>
+            <a:r>
+              <a:rPr lang="en-US" dirty="0">
+                <a:hlinkClick r:id="rId4" tooltip="Business value"/>
+              </a:rPr>
+              <a:t>business value</a:t>
+            </a:r>
+            <a:r>
+              <a:rPr lang="en-US" dirty="0"/>
+              <a:t> for whatever entity commissioned the software unit under construction.</a:t>
+            </a:r>
+            <a:endParaRPr lang="en-US" baseline="30000" dirty="0"/>
+          </a:p>
+          <a:p>
+            <a:endParaRPr lang="en-US" baseline="30000" dirty="0"/>
+          </a:p>
+          <a:p>
+            <a:r>
+              <a:rPr lang="en-US" dirty="0"/>
+              <a:t>Within BDD practice, this is referred to as BDD being an "outside-in" activity.</a:t>
             </a:r>
           </a:p>
         </p:txBody>
@@ -26189,7 +26203,7 @@
     </p:spTree>
     <p:extLst>
       <p:ext uri="{BB962C8B-B14F-4D97-AF65-F5344CB8AC3E}">
-        <p14:creationId xmlns:p14="http://schemas.microsoft.com/office/powerpoint/2010/main" val="337108220"/>
+        <p14:creationId xmlns:p14="http://schemas.microsoft.com/office/powerpoint/2010/main" val="532097225"/>
       </p:ext>
     </p:extLst>
   </p:cSld>
@@ -27622,7 +27636,7 @@
           <a:p>
             <a:r>
               <a:rPr lang="en-US" dirty="0"/>
-              <a:t>Examine Failure #1</a:t>
+              <a:t>Examine Failure</a:t>
             </a:r>
           </a:p>
         </p:txBody>
@@ -29076,7 +29090,31 @@
             <a:spLocks noGrp="1"/>
           </p:cNvSpPr>
           <p:nvPr>
-            <p:ph type="title"/>
+            <p:ph type="ctrTitle"/>
+          </p:nvPr>
+        </p:nvSpPr>
+        <p:spPr/>
+        <p:txBody>
+          <a:bodyPr>
+            <a:normAutofit fontScale="90000"/>
+          </a:bodyPr>
+          <a:lstStyle/>
+          <a:p>
+            <a:r>
+              <a:rPr lang="en-US" dirty="0"/>
+              <a:t>TDD and BDD</a:t>
+            </a:r>
+          </a:p>
+        </p:txBody>
+      </p:sp>
+      <p:sp>
+        <p:nvSpPr>
+          <p:cNvPr id="3" name="Subtitle 2"/>
+          <p:cNvSpPr>
+            <a:spLocks noGrp="1"/>
+          </p:cNvSpPr>
+          <p:nvPr>
+            <p:ph type="subTitle" idx="1"/>
           </p:nvPr>
         </p:nvSpPr>
         <p:spPr/>
@@ -29085,63 +29123,25 @@
           <a:lstStyle/>
           <a:p>
             <a:r>
-              <a:rPr lang="en-US" dirty="0"/>
-              <a:t>Objectives</a:t>
-            </a:r>
-          </a:p>
-        </p:txBody>
-      </p:sp>
-      <p:sp>
-        <p:nvSpPr>
-          <p:cNvPr id="3" name="Text Placeholder 2"/>
-          <p:cNvSpPr>
-            <a:spLocks noGrp="1"/>
-          </p:cNvSpPr>
-          <p:nvPr>
-            <p:ph type="body" sz="quarter" idx="12"/>
-          </p:nvPr>
-        </p:nvSpPr>
-        <p:spPr/>
-        <p:txBody>
-          <a:bodyPr/>
-          <a:lstStyle/>
-          <a:p>
-            <a:r>
-              <a:rPr lang="en-US" dirty="0"/>
-              <a:t>After completing this module, you should be able to:</a:t>
-            </a:r>
-          </a:p>
-          <a:p>
-            <a:endParaRPr lang="en-US" dirty="0"/>
-          </a:p>
-          <a:p>
-            <a:pPr marL="457200" indent="-457200">
-              <a:buFont typeface="Wingdings" charset="2"/>
-              <a:buChar char="Ø"/>
-            </a:pPr>
-            <a:r>
-              <a:rPr lang="en-US" dirty="0"/>
-              <a:t>Write an integration test</a:t>
-            </a:r>
-          </a:p>
-          <a:p>
-            <a:pPr marL="457200" indent="-457200">
-              <a:buFont typeface="Wingdings" charset="2"/>
-              <a:buChar char="Ø"/>
-            </a:pPr>
-            <a:r>
-              <a:rPr lang="en-US" dirty="0"/>
-              <a:t>Use Test Kitchen to create, converge, and verify a recipe</a:t>
-            </a:r>
-          </a:p>
-          <a:p>
-            <a:pPr marL="457200" indent="-457200">
-              <a:buFont typeface="Wingdings" charset="2"/>
-              <a:buChar char="Ø"/>
-            </a:pPr>
-            <a:r>
-              <a:rPr lang="en-US" dirty="0"/>
-              <a:t>Develop a cookbook with a test-driven approach</a:t>
+              <a:rPr lang="en-US" sz="3200" b="1" dirty="0"/>
+              <a:t>TDD </a:t>
+            </a:r>
+            <a:r>
+              <a:rPr lang="en-US" sz="3200" dirty="0"/>
+              <a:t>is a workflow process.</a:t>
+            </a:r>
+          </a:p>
+          <a:p>
+            <a:endParaRPr lang="en-US" sz="3200" b="1" dirty="0"/>
+          </a:p>
+          <a:p>
+            <a:r>
+              <a:rPr lang="en-US" sz="3200" b="1" dirty="0"/>
+              <a:t>BDD </a:t>
+            </a:r>
+            <a:r>
+              <a:rPr lang="en-US" sz="3200" dirty="0"/>
+              <a:t>influences the language we use to write tests and how we focus on the tests that matter.</a:t>
             </a:r>
           </a:p>
         </p:txBody>
@@ -29149,7 +29149,7 @@
     </p:spTree>
     <p:extLst>
       <p:ext uri="{BB962C8B-B14F-4D97-AF65-F5344CB8AC3E}">
-        <p14:creationId xmlns:p14="http://schemas.microsoft.com/office/powerpoint/2010/main" val="3816834146"/>
+        <p14:creationId xmlns:p14="http://schemas.microsoft.com/office/powerpoint/2010/main" val="337108220"/>
       </p:ext>
     </p:extLst>
   </p:cSld>
@@ -32124,15 +32124,6 @@
 </file>
 
 <file path=customXml/item1.xml><?xml version="1.0" encoding="utf-8"?>
-<?mso-contentType ?>
-<FormTemplates xmlns="http://schemas.microsoft.com/sharepoint/v3/contenttype/forms">
-  <Display>DocumentLibraryForm</Display>
-  <Edit>DocumentLibraryForm</Edit>
-  <New>DocumentLibraryForm</New>
-</FormTemplates>
-</file>
-
-<file path=customXml/item2.xml><?xml version="1.0" encoding="utf-8"?>
 <ct:contentTypeSchema xmlns:ct="http://schemas.microsoft.com/office/2006/metadata/contentType" xmlns:ma="http://schemas.microsoft.com/office/2006/metadata/properties/metaAttributes" ct:_="" ma:_="" ma:contentTypeName="Document" ma:contentTypeID="0x0101000812F700BE7F874999720E88173FE491" ma:contentTypeVersion="0" ma:contentTypeDescription="Create a new document." ma:contentTypeScope="" ma:versionID="3f79f408e2ca720b7aba6e0e32464d0c">
   <xsd:schema xmlns:xsd="http://www.w3.org/2001/XMLSchema" xmlns:xs="http://www.w3.org/2001/XMLSchema" xmlns:p="http://schemas.microsoft.com/office/2006/metadata/properties" xmlns:ns2="7bb5d761-a2ea-4873-95f7-7a6658fb3ef0" targetNamespace="http://schemas.microsoft.com/office/2006/metadata/properties" ma:root="true" ma:fieldsID="1e062cd38ba31e406bfc4340fbc7f87a" ns2:_="">
     <xsd:import namespace="7bb5d761-a2ea-4873-95f7-7a6658fb3ef0"/>
@@ -32277,19 +32268,16 @@
 </ct:contentTypeSchema>
 </file>
 
-<file path=customXml/item3.xml><?xml version="1.0" encoding="utf-8"?>
-<p:properties xmlns:p="http://schemas.microsoft.com/office/2006/metadata/properties" xmlns:xsi="http://www.w3.org/2001/XMLSchema-instance" xmlns:pc="http://schemas.microsoft.com/office/infopath/2007/PartnerControls">
-  <documentManagement>
-    <_dlc_DocId xmlns="7bb5d761-a2ea-4873-95f7-7a6658fb3ef0">M4CWTKMW727E-592-73</_dlc_DocId>
-    <_dlc_DocIdUrl xmlns="7bb5d761-a2ea-4873-95f7-7a6658fb3ef0">
-      <Url>https://kms.vci.local/marketing/team/_layouts/DocIdRedir.aspx?ID=M4CWTKMW727E-592-73</Url>
-      <Description>M4CWTKMW727E-592-73</Description>
-    </_dlc_DocIdUrl>
-  </documentManagement>
-</p:properties>
+<file path=customXml/item2.xml><?xml version="1.0" encoding="utf-8"?>
+<?mso-contentType ?>
+<FormTemplates xmlns="http://schemas.microsoft.com/sharepoint/v3/contenttype/forms">
+  <Display>DocumentLibraryForm</Display>
+  <Edit>DocumentLibraryForm</Edit>
+  <New>DocumentLibraryForm</New>
+</FormTemplates>
 </file>
 
-<file path=customXml/item4.xml><?xml version="1.0" encoding="utf-8"?>
+<file path=customXml/item3.xml><?xml version="1.0" encoding="utf-8"?>
 <?mso-contentType ?>
 <spe:Receivers xmlns:spe="http://schemas.microsoft.com/sharepoint/events">
   <Receiver>
@@ -32335,15 +32323,19 @@
 </spe:Receivers>
 </file>
 
-<file path=customXml/itemProps1.xml><?xml version="1.0" encoding="utf-8"?>
-<ds:datastoreItem xmlns:ds="http://schemas.openxmlformats.org/officeDocument/2006/customXml" ds:itemID="{5CDEB364-43EC-4510-9881-539C2A3FCE9E}">
-  <ds:schemaRefs>
-    <ds:schemaRef ds:uri="http://schemas.microsoft.com/sharepoint/v3/contenttype/forms"/>
-  </ds:schemaRefs>
-</ds:datastoreItem>
+<file path=customXml/item4.xml><?xml version="1.0" encoding="utf-8"?>
+<p:properties xmlns:p="http://schemas.microsoft.com/office/2006/metadata/properties" xmlns:xsi="http://www.w3.org/2001/XMLSchema-instance" xmlns:pc="http://schemas.microsoft.com/office/infopath/2007/PartnerControls">
+  <documentManagement>
+    <_dlc_DocId xmlns="7bb5d761-a2ea-4873-95f7-7a6658fb3ef0">M4CWTKMW727E-592-73</_dlc_DocId>
+    <_dlc_DocIdUrl xmlns="7bb5d761-a2ea-4873-95f7-7a6658fb3ef0">
+      <Url>https://kms.vci.local/marketing/team/_layouts/DocIdRedir.aspx?ID=M4CWTKMW727E-592-73</Url>
+      <Description>M4CWTKMW727E-592-73</Description>
+    </_dlc_DocIdUrl>
+  </documentManagement>
+</p:properties>
 </file>
 
-<file path=customXml/itemProps2.xml><?xml version="1.0" encoding="utf-8"?>
+<file path=customXml/itemProps1.xml><?xml version="1.0" encoding="utf-8"?>
 <ds:datastoreItem xmlns:ds="http://schemas.openxmlformats.org/officeDocument/2006/customXml" ds:itemID="{164479E5-0B02-49AC-B79E-EC1D6164DDD3}">
   <ds:schemaRefs>
     <ds:schemaRef ds:uri="http://schemas.microsoft.com/office/2006/metadata/contentType"/>
@@ -32361,7 +32353,23 @@
 </ds:datastoreItem>
 </file>
 
+<file path=customXml/itemProps2.xml><?xml version="1.0" encoding="utf-8"?>
+<ds:datastoreItem xmlns:ds="http://schemas.openxmlformats.org/officeDocument/2006/customXml" ds:itemID="{5CDEB364-43EC-4510-9881-539C2A3FCE9E}">
+  <ds:schemaRefs>
+    <ds:schemaRef ds:uri="http://schemas.microsoft.com/sharepoint/v3/contenttype/forms"/>
+  </ds:schemaRefs>
+</ds:datastoreItem>
+</file>
+
 <file path=customXml/itemProps3.xml><?xml version="1.0" encoding="utf-8"?>
+<ds:datastoreItem xmlns:ds="http://schemas.openxmlformats.org/officeDocument/2006/customXml" ds:itemID="{B13EBC30-FE27-4C6A-B723-23FC2188F7DC}">
+  <ds:schemaRefs>
+    <ds:schemaRef ds:uri="http://schemas.microsoft.com/sharepoint/events"/>
+  </ds:schemaRefs>
+</ds:datastoreItem>
+</file>
+
+<file path=customXml/itemProps4.xml><?xml version="1.0" encoding="utf-8"?>
 <ds:datastoreItem xmlns:ds="http://schemas.openxmlformats.org/officeDocument/2006/customXml" ds:itemID="{6921749B-AEB7-461B-845F-603CABD25259}">
   <ds:schemaRefs>
     <ds:schemaRef ds:uri="7bb5d761-a2ea-4873-95f7-7a6658fb3ef0"/>
@@ -32375,12 +32383,4 @@
     <ds:schemaRef ds:uri="http://www.w3.org/XML/1998/namespace"/>
   </ds:schemaRefs>
 </ds:datastoreItem>
-</file>
-
-<file path=customXml/itemProps4.xml><?xml version="1.0" encoding="utf-8"?>
-<ds:datastoreItem xmlns:ds="http://schemas.openxmlformats.org/officeDocument/2006/customXml" ds:itemID="{B13EBC30-FE27-4C6A-B723-23FC2188F7DC}">
-  <ds:schemaRefs>
-    <ds:schemaRef ds:uri="http://schemas.microsoft.com/sharepoint/events"/>
-  </ds:schemaRefs>
-</ds:datastoreItem>
 </file>
</xml_diff>